<commit_message>
Actualización en los documentos
Actualización de los archivos con la parte de datos y de método
</commit_message>
<xml_diff>
--- a/Images/Propuesta_webpage.pptx
+++ b/Images/Propuesta_webpage.pptx
@@ -104,6 +104,11 @@
       </a:defRPr>
     </a:lvl9pPr>
   </p:defaultTextStyle>
+  <p:extLst>
+    <p:ext uri="{EFAFB233-063F-42B5-8137-9DF3F51BA10A}">
+      <p15:sldGuideLst xmlns:p15="http://schemas.microsoft.com/office/powerpoint/2012/main"/>
+    </p:ext>
+  </p:extLst>
 </p:presentation>
 </file>
 
@@ -2980,7 +2985,7 @@
         </p:nvSpPr>
         <p:spPr>
           <a:xfrm>
-            <a:off x="983886" y="373175"/>
+            <a:off x="918827" y="144575"/>
             <a:ext cx="8854157" cy="8627156"/>
           </a:xfrm>
           <a:prstGeom prst="rect">
@@ -3072,7 +3077,7 @@
                   </a:outerShdw>
                 </a:effectLst>
               </a:rPr>
-              <a:t>Predicción del precio de bolsa del Mercado Eléctrico Mayorista colombiano</a:t>
+              <a:t>Predicción del precio de bolsa del Mercado de 	Energía Mayorista colombiano</a:t>
             </a:r>
             <a:endParaRPr lang="es-CO" sz="2400" b="1" dirty="0">
               <a:solidFill>
@@ -3314,10 +3319,10 @@
       </p:sp>
       <p:sp>
         <p:nvSpPr>
-          <p:cNvPr id="15" name="Rectángulo 14">
+          <p:cNvPr id="16" name="Rectángulo 15">
             <a:extLst>
               <a:ext uri="{FF2B5EF4-FFF2-40B4-BE49-F238E27FC236}">
-                <a16:creationId xmlns:a16="http://schemas.microsoft.com/office/drawing/2014/main" id="{64170D0D-A5CF-4171-82B8-8D9AD4B373CB}"/>
+                <a16:creationId xmlns:a16="http://schemas.microsoft.com/office/drawing/2014/main" id="{B8612B7A-E27A-4F24-8DA6-599EC82D97AA}"/>
               </a:ext>
             </a:extLst>
           </p:cNvPr>
@@ -3326,7 +3331,7 @@
         </p:nvSpPr>
         <p:spPr>
           <a:xfrm>
-            <a:off x="2376840" y="7274609"/>
+            <a:off x="2366709" y="2729383"/>
             <a:ext cx="780395" cy="342553"/>
           </a:xfrm>
           <a:prstGeom prst="rect">
@@ -3363,10 +3368,10 @@
       </p:sp>
       <p:sp>
         <p:nvSpPr>
-          <p:cNvPr id="16" name="Rectángulo 15">
+          <p:cNvPr id="17" name="Rectángulo 16">
             <a:extLst>
               <a:ext uri="{FF2B5EF4-FFF2-40B4-BE49-F238E27FC236}">
-                <a16:creationId xmlns:a16="http://schemas.microsoft.com/office/drawing/2014/main" id="{B8612B7A-E27A-4F24-8DA6-599EC82D97AA}"/>
+                <a16:creationId xmlns:a16="http://schemas.microsoft.com/office/drawing/2014/main" id="{6394DDC0-80D9-4DED-B180-B78276279914}"/>
               </a:ext>
             </a:extLst>
           </p:cNvPr>
@@ -3375,7 +3380,7 @@
         </p:nvSpPr>
         <p:spPr>
           <a:xfrm>
-            <a:off x="2366709" y="2729383"/>
+            <a:off x="2366709" y="3298005"/>
             <a:ext cx="780395" cy="342553"/>
           </a:xfrm>
           <a:prstGeom prst="rect">
@@ -3412,10 +3417,10 @@
       </p:sp>
       <p:sp>
         <p:nvSpPr>
-          <p:cNvPr id="17" name="Rectángulo 16">
+          <p:cNvPr id="18" name="Rectángulo 17">
             <a:extLst>
               <a:ext uri="{FF2B5EF4-FFF2-40B4-BE49-F238E27FC236}">
-                <a16:creationId xmlns:a16="http://schemas.microsoft.com/office/drawing/2014/main" id="{6394DDC0-80D9-4DED-B180-B78276279914}"/>
+                <a16:creationId xmlns:a16="http://schemas.microsoft.com/office/drawing/2014/main" id="{54104B1E-09F7-4D34-88C0-3D9B2239D12B}"/>
               </a:ext>
             </a:extLst>
           </p:cNvPr>
@@ -3424,7 +3429,7 @@
         </p:nvSpPr>
         <p:spPr>
           <a:xfrm>
-            <a:off x="2366709" y="3298005"/>
+            <a:off x="2366707" y="5351161"/>
             <a:ext cx="780395" cy="342553"/>
           </a:xfrm>
           <a:prstGeom prst="rect">
@@ -3461,10 +3466,10 @@
       </p:sp>
       <p:sp>
         <p:nvSpPr>
-          <p:cNvPr id="18" name="Rectángulo 17">
+          <p:cNvPr id="20" name="Rectángulo 19">
             <a:extLst>
               <a:ext uri="{FF2B5EF4-FFF2-40B4-BE49-F238E27FC236}">
-                <a16:creationId xmlns:a16="http://schemas.microsoft.com/office/drawing/2014/main" id="{54104B1E-09F7-4D34-88C0-3D9B2239D12B}"/>
+                <a16:creationId xmlns:a16="http://schemas.microsoft.com/office/drawing/2014/main" id="{C571AFF2-D595-4777-A041-9005F65A3D44}"/>
               </a:ext>
             </a:extLst>
           </p:cNvPr>
@@ -3473,14 +3478,17 @@
         </p:nvSpPr>
         <p:spPr>
           <a:xfrm>
-            <a:off x="2366707" y="5351161"/>
-            <a:ext cx="780395" cy="342553"/>
+            <a:off x="5968227" y="3388771"/>
+            <a:ext cx="2407759" cy="1218112"/>
           </a:xfrm>
           <a:prstGeom prst="rect">
             <a:avLst/>
           </a:prstGeom>
           <a:solidFill>
-            <a:schemeClr val="bg1"/>
+            <a:schemeClr val="accent5">
+              <a:lumMod val="40000"/>
+              <a:lumOff val="60000"/>
+            </a:schemeClr>
           </a:solidFill>
         </p:spPr>
         <p:style>
@@ -3504,16 +3512,171 @@
           <a:lstStyle/>
           <a:p>
             <a:pPr algn="ctr"/>
-            <a:endParaRPr lang="es-CO" sz="1579"/>
-          </a:p>
-        </p:txBody>
-      </p:sp>
-      <p:sp>
-        <p:nvSpPr>
-          <p:cNvPr id="20" name="Rectángulo 19">
+            <a:r>
+              <a:rPr lang="es-ES" sz="1579" dirty="0">
+                <a:solidFill>
+                  <a:schemeClr val="tx1"/>
+                </a:solidFill>
+              </a:rPr>
+              <a:t>200 $/kWh</a:t>
+            </a:r>
+            <a:endParaRPr lang="es-CO" sz="1579" dirty="0">
+              <a:solidFill>
+                <a:schemeClr val="tx1"/>
+              </a:solidFill>
+            </a:endParaRPr>
+          </a:p>
+        </p:txBody>
+      </p:sp>
+      <p:sp>
+        <p:nvSpPr>
+          <p:cNvPr id="21" name="CuadroTexto 20">
             <a:extLst>
               <a:ext uri="{FF2B5EF4-FFF2-40B4-BE49-F238E27FC236}">
-                <a16:creationId xmlns:a16="http://schemas.microsoft.com/office/drawing/2014/main" id="{C571AFF2-D595-4777-A041-9005F65A3D44}"/>
+                <a16:creationId xmlns:a16="http://schemas.microsoft.com/office/drawing/2014/main" id="{A9BBBFDD-B226-4606-BE65-59D881DEB8B1}"/>
+              </a:ext>
+            </a:extLst>
+          </p:cNvPr>
+          <p:cNvSpPr txBox="1"/>
+          <p:nvPr/>
+        </p:nvSpPr>
+        <p:spPr>
+          <a:xfrm>
+            <a:off x="1381298" y="3082894"/>
+            <a:ext cx="1329561" cy="740011"/>
+          </a:xfrm>
+          <a:prstGeom prst="rect">
+            <a:avLst/>
+          </a:prstGeom>
+          <a:noFill/>
+        </p:spPr>
+        <p:txBody>
+          <a:bodyPr wrap="square" rtlCol="0">
+            <a:spAutoFit/>
+          </a:bodyPr>
+          <a:lstStyle/>
+          <a:p>
+            <a:r>
+              <a:rPr lang="es-ES" sz="1403" dirty="0">
+                <a:solidFill>
+                  <a:schemeClr val="bg1">
+                    <a:lumMod val="85000"/>
+                  </a:schemeClr>
+                </a:solidFill>
+                <a:effectLst>
+                  <a:outerShdw blurRad="38100" dist="38100" dir="2700000" algn="tl">
+                    <a:srgbClr val="000000">
+                      <a:alpha val="43137"/>
+                    </a:srgbClr>
+                  </a:outerShdw>
+                </a:effectLst>
+              </a:rPr>
+              <a:t>Precio del carbón (en COP)</a:t>
+            </a:r>
+            <a:endParaRPr lang="es-CO" sz="1403" dirty="0">
+              <a:solidFill>
+                <a:schemeClr val="bg1">
+                  <a:lumMod val="85000"/>
+                </a:schemeClr>
+              </a:solidFill>
+              <a:effectLst>
+                <a:outerShdw blurRad="38100" dist="38100" dir="2700000" algn="tl">
+                  <a:srgbClr val="000000">
+                    <a:alpha val="43137"/>
+                  </a:srgbClr>
+                </a:outerShdw>
+              </a:effectLst>
+            </a:endParaRPr>
+          </a:p>
+        </p:txBody>
+      </p:sp>
+      <p:sp>
+        <p:nvSpPr>
+          <p:cNvPr id="25" name="CuadroTexto 24">
+            <a:extLst>
+              <a:ext uri="{FF2B5EF4-FFF2-40B4-BE49-F238E27FC236}">
+                <a16:creationId xmlns:a16="http://schemas.microsoft.com/office/drawing/2014/main" id="{3E651B13-8C96-4703-A094-8BE48A303DFA}"/>
+              </a:ext>
+            </a:extLst>
+          </p:cNvPr>
+          <p:cNvSpPr txBox="1"/>
+          <p:nvPr/>
+        </p:nvSpPr>
+        <p:spPr>
+          <a:xfrm>
+            <a:off x="1349322" y="3772458"/>
+            <a:ext cx="1329561" cy="740011"/>
+          </a:xfrm>
+          <a:prstGeom prst="rect">
+            <a:avLst/>
+          </a:prstGeom>
+          <a:noFill/>
+        </p:spPr>
+        <p:txBody>
+          <a:bodyPr wrap="square" rtlCol="0">
+            <a:spAutoFit/>
+          </a:bodyPr>
+          <a:lstStyle/>
+          <a:p>
+            <a:r>
+              <a:rPr lang="es-ES" sz="1403" dirty="0">
+                <a:solidFill>
+                  <a:schemeClr val="bg1">
+                    <a:lumMod val="85000"/>
+                  </a:schemeClr>
+                </a:solidFill>
+                <a:effectLst>
+                  <a:outerShdw blurRad="38100" dist="38100" dir="2700000" algn="tl">
+                    <a:srgbClr val="000000">
+                      <a:alpha val="43137"/>
+                    </a:srgbClr>
+                  </a:outerShdw>
+                </a:effectLst>
+              </a:rPr>
+              <a:t>Precio del fueloil </a:t>
+            </a:r>
+          </a:p>
+          <a:p>
+            <a:r>
+              <a:rPr lang="es-ES" sz="1403" dirty="0">
+                <a:solidFill>
+                  <a:schemeClr val="bg1">
+                    <a:lumMod val="85000"/>
+                  </a:schemeClr>
+                </a:solidFill>
+                <a:effectLst>
+                  <a:outerShdw blurRad="38100" dist="38100" dir="2700000" algn="tl">
+                    <a:srgbClr val="000000">
+                      <a:alpha val="43137"/>
+                    </a:srgbClr>
+                  </a:outerShdw>
+                </a:effectLst>
+              </a:rPr>
+              <a:t>(en COP)</a:t>
+            </a:r>
+            <a:endParaRPr lang="es-CO" sz="1403" dirty="0">
+              <a:solidFill>
+                <a:schemeClr val="bg1">
+                  <a:lumMod val="85000"/>
+                </a:schemeClr>
+              </a:solidFill>
+              <a:effectLst>
+                <a:outerShdw blurRad="38100" dist="38100" dir="2700000" algn="tl">
+                  <a:srgbClr val="000000">
+                    <a:alpha val="43137"/>
+                  </a:srgbClr>
+                </a:outerShdw>
+              </a:effectLst>
+            </a:endParaRPr>
+          </a:p>
+        </p:txBody>
+      </p:sp>
+      <p:sp>
+        <p:nvSpPr>
+          <p:cNvPr id="26" name="Rectángulo 25">
+            <a:extLst>
+              <a:ext uri="{FF2B5EF4-FFF2-40B4-BE49-F238E27FC236}">
+                <a16:creationId xmlns:a16="http://schemas.microsoft.com/office/drawing/2014/main" id="{A0910016-062A-4E76-A946-C4DA1A413810}"/>
               </a:ext>
             </a:extLst>
           </p:cNvPr>
@@ -3522,17 +3685,14 @@
         </p:nvSpPr>
         <p:spPr>
           <a:xfrm>
-            <a:off x="5968227" y="3388771"/>
-            <a:ext cx="2407759" cy="1218112"/>
+            <a:off x="2366707" y="4606883"/>
+            <a:ext cx="780395" cy="342553"/>
           </a:xfrm>
           <a:prstGeom prst="rect">
             <a:avLst/>
           </a:prstGeom>
           <a:solidFill>
-            <a:schemeClr val="accent5">
-              <a:lumMod val="40000"/>
-              <a:lumOff val="60000"/>
-            </a:schemeClr>
+            <a:schemeClr val="bg1"/>
           </a:solidFill>
         </p:spPr>
         <p:style>
@@ -3556,28 +3716,16 @@
           <a:lstStyle/>
           <a:p>
             <a:pPr algn="ctr"/>
-            <a:r>
-              <a:rPr lang="es-ES" sz="1579" dirty="0">
-                <a:solidFill>
-                  <a:schemeClr val="tx1"/>
-                </a:solidFill>
-              </a:rPr>
-              <a:t>200 $/kWh</a:t>
-            </a:r>
-            <a:endParaRPr lang="es-CO" sz="1579" dirty="0">
-              <a:solidFill>
-                <a:schemeClr val="tx1"/>
-              </a:solidFill>
-            </a:endParaRPr>
-          </a:p>
-        </p:txBody>
-      </p:sp>
-      <p:sp>
-        <p:nvSpPr>
-          <p:cNvPr id="21" name="CuadroTexto 20">
+            <a:endParaRPr lang="es-CO" sz="1579"/>
+          </a:p>
+        </p:txBody>
+      </p:sp>
+      <p:sp>
+        <p:nvSpPr>
+          <p:cNvPr id="27" name="CuadroTexto 26">
             <a:extLst>
               <a:ext uri="{FF2B5EF4-FFF2-40B4-BE49-F238E27FC236}">
-                <a16:creationId xmlns:a16="http://schemas.microsoft.com/office/drawing/2014/main" id="{A9BBBFDD-B226-4606-BE65-59D881DEB8B1}"/>
+                <a16:creationId xmlns:a16="http://schemas.microsoft.com/office/drawing/2014/main" id="{F1E64FC3-98DC-4F59-8B02-4E4113235C0E}"/>
               </a:ext>
             </a:extLst>
           </p:cNvPr>
@@ -3586,7 +3734,7 @@
         </p:nvSpPr>
         <p:spPr>
           <a:xfrm>
-            <a:off x="1381298" y="3082894"/>
+            <a:off x="1349322" y="4514894"/>
             <a:ext cx="1329561" cy="740011"/>
           </a:xfrm>
           <a:prstGeom prst="rect">
@@ -3615,7 +3763,7 @@
                   </a:outerShdw>
                 </a:effectLst>
               </a:rPr>
-              <a:t>Precio del carbón (en COP)</a:t>
+              <a:t>Aportes hídricos (en GWh)</a:t>
             </a:r>
             <a:endParaRPr lang="es-CO" sz="1403" dirty="0">
               <a:solidFill>
@@ -3636,153 +3784,10 @@
       </p:sp>
       <p:sp>
         <p:nvSpPr>
-          <p:cNvPr id="22" name="CuadroTexto 21">
+          <p:cNvPr id="28" name="Rectángulo 27">
             <a:extLst>
               <a:ext uri="{FF2B5EF4-FFF2-40B4-BE49-F238E27FC236}">
-                <a16:creationId xmlns:a16="http://schemas.microsoft.com/office/drawing/2014/main" id="{9C08444E-5284-42BD-9463-BDA4221EC6EF}"/>
-              </a:ext>
-            </a:extLst>
-          </p:cNvPr>
-          <p:cNvSpPr txBox="1"/>
-          <p:nvPr/>
-        </p:nvSpPr>
-        <p:spPr>
-          <a:xfrm>
-            <a:off x="1393750" y="3749938"/>
-            <a:ext cx="1329561" cy="740011"/>
-          </a:xfrm>
-          <a:prstGeom prst="rect">
-            <a:avLst/>
-          </a:prstGeom>
-          <a:noFill/>
-        </p:spPr>
-        <p:txBody>
-          <a:bodyPr wrap="square" rtlCol="0">
-            <a:spAutoFit/>
-          </a:bodyPr>
-          <a:lstStyle/>
-          <a:p>
-            <a:r>
-              <a:rPr lang="es-ES" sz="1403" dirty="0">
-                <a:solidFill>
-                  <a:schemeClr val="bg1">
-                    <a:lumMod val="85000"/>
-                  </a:schemeClr>
-                </a:solidFill>
-                <a:effectLst>
-                  <a:outerShdw blurRad="38100" dist="38100" dir="2700000" algn="tl">
-                    <a:srgbClr val="000000">
-                      <a:alpha val="43137"/>
-                    </a:srgbClr>
-                  </a:outerShdw>
-                </a:effectLst>
-              </a:rPr>
-              <a:t>Precio del carbón (en COP)</a:t>
-            </a:r>
-            <a:endParaRPr lang="es-CO" sz="1403" dirty="0">
-              <a:solidFill>
-                <a:schemeClr val="bg1">
-                  <a:lumMod val="85000"/>
-                </a:schemeClr>
-              </a:solidFill>
-              <a:effectLst>
-                <a:outerShdw blurRad="38100" dist="38100" dir="2700000" algn="tl">
-                  <a:srgbClr val="000000">
-                    <a:alpha val="43137"/>
-                  </a:srgbClr>
-                </a:outerShdw>
-              </a:effectLst>
-            </a:endParaRPr>
-          </a:p>
-        </p:txBody>
-      </p:sp>
-      <p:sp>
-        <p:nvSpPr>
-          <p:cNvPr id="25" name="CuadroTexto 24">
-            <a:extLst>
-              <a:ext uri="{FF2B5EF4-FFF2-40B4-BE49-F238E27FC236}">
-                <a16:creationId xmlns:a16="http://schemas.microsoft.com/office/drawing/2014/main" id="{3E651B13-8C96-4703-A094-8BE48A303DFA}"/>
-              </a:ext>
-            </a:extLst>
-          </p:cNvPr>
-          <p:cNvSpPr txBox="1"/>
-          <p:nvPr/>
-        </p:nvSpPr>
-        <p:spPr>
-          <a:xfrm>
-            <a:off x="1393750" y="4475602"/>
-            <a:ext cx="1329561" cy="740011"/>
-          </a:xfrm>
-          <a:prstGeom prst="rect">
-            <a:avLst/>
-          </a:prstGeom>
-          <a:noFill/>
-        </p:spPr>
-        <p:txBody>
-          <a:bodyPr wrap="square" rtlCol="0">
-            <a:spAutoFit/>
-          </a:bodyPr>
-          <a:lstStyle/>
-          <a:p>
-            <a:r>
-              <a:rPr lang="es-ES" sz="1403" dirty="0">
-                <a:solidFill>
-                  <a:schemeClr val="bg1">
-                    <a:lumMod val="85000"/>
-                  </a:schemeClr>
-                </a:solidFill>
-                <a:effectLst>
-                  <a:outerShdw blurRad="38100" dist="38100" dir="2700000" algn="tl">
-                    <a:srgbClr val="000000">
-                      <a:alpha val="43137"/>
-                    </a:srgbClr>
-                  </a:outerShdw>
-                </a:effectLst>
-              </a:rPr>
-              <a:t>Precio del fueloil </a:t>
-            </a:r>
-          </a:p>
-          <a:p>
-            <a:r>
-              <a:rPr lang="es-ES" sz="1403" dirty="0">
-                <a:solidFill>
-                  <a:schemeClr val="bg1">
-                    <a:lumMod val="85000"/>
-                  </a:schemeClr>
-                </a:solidFill>
-                <a:effectLst>
-                  <a:outerShdw blurRad="38100" dist="38100" dir="2700000" algn="tl">
-                    <a:srgbClr val="000000">
-                      <a:alpha val="43137"/>
-                    </a:srgbClr>
-                  </a:outerShdw>
-                </a:effectLst>
-              </a:rPr>
-              <a:t>(en COP)</a:t>
-            </a:r>
-            <a:endParaRPr lang="es-CO" sz="1403" dirty="0">
-              <a:solidFill>
-                <a:schemeClr val="bg1">
-                  <a:lumMod val="85000"/>
-                </a:schemeClr>
-              </a:solidFill>
-              <a:effectLst>
-                <a:outerShdw blurRad="38100" dist="38100" dir="2700000" algn="tl">
-                  <a:srgbClr val="000000">
-                    <a:alpha val="43137"/>
-                  </a:srgbClr>
-                </a:outerShdw>
-              </a:effectLst>
-            </a:endParaRPr>
-          </a:p>
-        </p:txBody>
-      </p:sp>
-      <p:sp>
-        <p:nvSpPr>
-          <p:cNvPr id="26" name="Rectángulo 25">
-            <a:extLst>
-              <a:ext uri="{FF2B5EF4-FFF2-40B4-BE49-F238E27FC236}">
-                <a16:creationId xmlns:a16="http://schemas.microsoft.com/office/drawing/2014/main" id="{A0910016-062A-4E76-A946-C4DA1A413810}"/>
+                <a16:creationId xmlns:a16="http://schemas.microsoft.com/office/drawing/2014/main" id="{B83B3846-F112-4CA3-980F-21811F54534C}"/>
               </a:ext>
             </a:extLst>
           </p:cNvPr>
@@ -3791,7 +3796,7 @@
         </p:nvSpPr>
         <p:spPr>
           <a:xfrm>
-            <a:off x="2366707" y="4606883"/>
+            <a:off x="2366707" y="6017837"/>
             <a:ext cx="780395" cy="342553"/>
           </a:xfrm>
           <a:prstGeom prst="rect">
@@ -3828,72 +3833,10 @@
       </p:sp>
       <p:sp>
         <p:nvSpPr>
-          <p:cNvPr id="27" name="CuadroTexto 26">
+          <p:cNvPr id="29" name="Rectángulo 28">
             <a:extLst>
               <a:ext uri="{FF2B5EF4-FFF2-40B4-BE49-F238E27FC236}">
-                <a16:creationId xmlns:a16="http://schemas.microsoft.com/office/drawing/2014/main" id="{F1E64FC3-98DC-4F59-8B02-4E4113235C0E}"/>
-              </a:ext>
-            </a:extLst>
-          </p:cNvPr>
-          <p:cNvSpPr txBox="1"/>
-          <p:nvPr/>
-        </p:nvSpPr>
-        <p:spPr>
-          <a:xfrm>
-            <a:off x="1381297" y="5161934"/>
-            <a:ext cx="1329561" cy="740011"/>
-          </a:xfrm>
-          <a:prstGeom prst="rect">
-            <a:avLst/>
-          </a:prstGeom>
-          <a:noFill/>
-        </p:spPr>
-        <p:txBody>
-          <a:bodyPr wrap="square" rtlCol="0">
-            <a:spAutoFit/>
-          </a:bodyPr>
-          <a:lstStyle/>
-          <a:p>
-            <a:r>
-              <a:rPr lang="es-ES" sz="1403" dirty="0">
-                <a:solidFill>
-                  <a:schemeClr val="bg1">
-                    <a:lumMod val="85000"/>
-                  </a:schemeClr>
-                </a:solidFill>
-                <a:effectLst>
-                  <a:outerShdw blurRad="38100" dist="38100" dir="2700000" algn="tl">
-                    <a:srgbClr val="000000">
-                      <a:alpha val="43137"/>
-                    </a:srgbClr>
-                  </a:outerShdw>
-                </a:effectLst>
-              </a:rPr>
-              <a:t>Aportes hídricos (en GWh)</a:t>
-            </a:r>
-            <a:endParaRPr lang="es-CO" sz="1403" dirty="0">
-              <a:solidFill>
-                <a:schemeClr val="bg1">
-                  <a:lumMod val="85000"/>
-                </a:schemeClr>
-              </a:solidFill>
-              <a:effectLst>
-                <a:outerShdw blurRad="38100" dist="38100" dir="2700000" algn="tl">
-                  <a:srgbClr val="000000">
-                    <a:alpha val="43137"/>
-                  </a:srgbClr>
-                </a:outerShdw>
-              </a:effectLst>
-            </a:endParaRPr>
-          </a:p>
-        </p:txBody>
-      </p:sp>
-      <p:sp>
-        <p:nvSpPr>
-          <p:cNvPr id="28" name="Rectángulo 27">
-            <a:extLst>
-              <a:ext uri="{FF2B5EF4-FFF2-40B4-BE49-F238E27FC236}">
-                <a16:creationId xmlns:a16="http://schemas.microsoft.com/office/drawing/2014/main" id="{B83B3846-F112-4CA3-980F-21811F54534C}"/>
+                <a16:creationId xmlns:a16="http://schemas.microsoft.com/office/drawing/2014/main" id="{67CF2D45-A85C-4DEA-B4C5-3425B7AD8DAA}"/>
               </a:ext>
             </a:extLst>
           </p:cNvPr>
@@ -3902,7 +3845,7 @@
         </p:nvSpPr>
         <p:spPr>
           <a:xfrm>
-            <a:off x="2366707" y="6017837"/>
+            <a:off x="2366706" y="6646223"/>
             <a:ext cx="780395" cy="342553"/>
           </a:xfrm>
           <a:prstGeom prst="rect">
@@ -3939,55 +3882,6 @@
       </p:sp>
       <p:sp>
         <p:nvSpPr>
-          <p:cNvPr id="29" name="Rectángulo 28">
-            <a:extLst>
-              <a:ext uri="{FF2B5EF4-FFF2-40B4-BE49-F238E27FC236}">
-                <a16:creationId xmlns:a16="http://schemas.microsoft.com/office/drawing/2014/main" id="{67CF2D45-A85C-4DEA-B4C5-3425B7AD8DAA}"/>
-              </a:ext>
-            </a:extLst>
-          </p:cNvPr>
-          <p:cNvSpPr/>
-          <p:nvPr/>
-        </p:nvSpPr>
-        <p:spPr>
-          <a:xfrm>
-            <a:off x="2366706" y="6646223"/>
-            <a:ext cx="780395" cy="342553"/>
-          </a:xfrm>
-          <a:prstGeom prst="rect">
-            <a:avLst/>
-          </a:prstGeom>
-          <a:solidFill>
-            <a:schemeClr val="bg1"/>
-          </a:solidFill>
-        </p:spPr>
-        <p:style>
-          <a:lnRef idx="2">
-            <a:schemeClr val="accent1">
-              <a:shade val="50000"/>
-            </a:schemeClr>
-          </a:lnRef>
-          <a:fillRef idx="1">
-            <a:schemeClr val="accent1"/>
-          </a:fillRef>
-          <a:effectRef idx="0">
-            <a:schemeClr val="accent1"/>
-          </a:effectRef>
-          <a:fontRef idx="minor">
-            <a:schemeClr val="lt1"/>
-          </a:fontRef>
-        </p:style>
-        <p:txBody>
-          <a:bodyPr rtlCol="0" anchor="ctr"/>
-          <a:lstStyle/>
-          <a:p>
-            <a:pPr algn="ctr"/>
-            <a:endParaRPr lang="es-CO" sz="1579"/>
-          </a:p>
-        </p:txBody>
-      </p:sp>
-      <p:sp>
-        <p:nvSpPr>
           <p:cNvPr id="30" name="CuadroTexto 29">
             <a:extLst>
               <a:ext uri="{FF2B5EF4-FFF2-40B4-BE49-F238E27FC236}">
@@ -4000,7 +3894,7 @@
         </p:nvSpPr>
         <p:spPr>
           <a:xfrm>
-            <a:off x="1362631" y="5867922"/>
+            <a:off x="1349322" y="5204159"/>
             <a:ext cx="1329561" cy="740011"/>
           </a:xfrm>
           <a:prstGeom prst="rect">
@@ -4062,7 +3956,7 @@
         </p:nvSpPr>
         <p:spPr>
           <a:xfrm>
-            <a:off x="1262130" y="6679650"/>
+            <a:off x="1203947" y="6054414"/>
             <a:ext cx="1329561" cy="307777"/>
           </a:xfrm>
           <a:prstGeom prst="rect">
@@ -4124,7 +4018,7 @@
         </p:nvSpPr>
         <p:spPr>
           <a:xfrm>
-            <a:off x="1642880" y="7278211"/>
+            <a:off x="1574205" y="6645918"/>
             <a:ext cx="1136654" cy="335348"/>
           </a:xfrm>
           <a:prstGeom prst="rect">
@@ -4186,7 +4080,7 @@
         </p:nvSpPr>
         <p:spPr>
           <a:xfrm>
-            <a:off x="1463040" y="7924800"/>
+            <a:off x="1463040" y="7543400"/>
             <a:ext cx="1973580" cy="658687"/>
           </a:xfrm>
           <a:prstGeom prst="rect">
@@ -4504,13 +4398,13 @@
   <p:clrMapOvr>
     <a:masterClrMapping/>
   </p:clrMapOvr>
-  <mc:AlternateContent xmlns:mc="http://schemas.openxmlformats.org/markup-compatibility/2006">
-    <mc:Choice xmlns:p14="http://schemas.microsoft.com/office/powerpoint/2010/main" Requires="p14">
+  <mc:AlternateContent xmlns:mc="http://schemas.openxmlformats.org/markup-compatibility/2006" xmlns:p14="http://schemas.microsoft.com/office/powerpoint/2010/main">
+    <mc:Choice Requires="p14">
       <p:transition spd="med" p14:dur="700">
         <p:fade/>
       </p:transition>
     </mc:Choice>
-    <mc:Fallback>
+    <mc:Fallback xmlns="">
       <p:transition spd="med">
         <p:fade/>
       </p:transition>

</xml_diff>